<commit_message>
Added version 2 of paper
</commit_message>
<xml_diff>
--- a/Manuscript-06022021/Images/Creative/FilteringPictures.pptx
+++ b/Manuscript-06022021/Images/Creative/FilteringPictures.pptx
@@ -8,6 +8,10 @@
     <p:sldId id="256" r:id="rId2"/>
     <p:sldId id="258" r:id="rId3"/>
     <p:sldId id="257" r:id="rId4"/>
+    <p:sldId id="259" r:id="rId5"/>
+    <p:sldId id="260" r:id="rId6"/>
+    <p:sldId id="262" r:id="rId7"/>
+    <p:sldId id="261" r:id="rId8"/>
   </p:sldIdLst>
   <p:sldSz cx="12192000" cy="6858000"/>
   <p:notesSz cx="6858000" cy="9144000"/>
@@ -106,6 +110,11 @@
       </a:defRPr>
     </a:lvl9pPr>
   </p:defaultTextStyle>
+  <p:extLst>
+    <p:ext uri="{EFAFB233-063F-42B5-8137-9DF3F51BA10A}">
+      <p15:sldGuideLst xmlns:p15="http://schemas.microsoft.com/office/powerpoint/2012/main"/>
+    </p:ext>
+  </p:extLst>
 </p:presentation>
 </file>
 
@@ -240,7 +249,7 @@
           <a:p>
             <a:fld id="{3FA9CB7B-DC52-4E63-8520-2B2B3A0CCB2D}" type="datetimeFigureOut">
               <a:rPr lang="en-US" smtClean="0"/>
-              <a:t>6/8/2021</a:t>
+              <a:t>6/9/2021</a:t>
             </a:fld>
             <a:endParaRPr lang="en-US"/>
           </a:p>
@@ -410,7 +419,7 @@
           <a:p>
             <a:fld id="{3FA9CB7B-DC52-4E63-8520-2B2B3A0CCB2D}" type="datetimeFigureOut">
               <a:rPr lang="en-US" smtClean="0"/>
-              <a:t>6/8/2021</a:t>
+              <a:t>6/9/2021</a:t>
             </a:fld>
             <a:endParaRPr lang="en-US"/>
           </a:p>
@@ -590,7 +599,7 @@
           <a:p>
             <a:fld id="{3FA9CB7B-DC52-4E63-8520-2B2B3A0CCB2D}" type="datetimeFigureOut">
               <a:rPr lang="en-US" smtClean="0"/>
-              <a:t>6/8/2021</a:t>
+              <a:t>6/9/2021</a:t>
             </a:fld>
             <a:endParaRPr lang="en-US"/>
           </a:p>
@@ -760,7 +769,7 @@
           <a:p>
             <a:fld id="{3FA9CB7B-DC52-4E63-8520-2B2B3A0CCB2D}" type="datetimeFigureOut">
               <a:rPr lang="en-US" smtClean="0"/>
-              <a:t>6/8/2021</a:t>
+              <a:t>6/9/2021</a:t>
             </a:fld>
             <a:endParaRPr lang="en-US"/>
           </a:p>
@@ -1006,7 +1015,7 @@
           <a:p>
             <a:fld id="{3FA9CB7B-DC52-4E63-8520-2B2B3A0CCB2D}" type="datetimeFigureOut">
               <a:rPr lang="en-US" smtClean="0"/>
-              <a:t>6/8/2021</a:t>
+              <a:t>6/9/2021</a:t>
             </a:fld>
             <a:endParaRPr lang="en-US"/>
           </a:p>
@@ -1238,7 +1247,7 @@
           <a:p>
             <a:fld id="{3FA9CB7B-DC52-4E63-8520-2B2B3A0CCB2D}" type="datetimeFigureOut">
               <a:rPr lang="en-US" smtClean="0"/>
-              <a:t>6/8/2021</a:t>
+              <a:t>6/9/2021</a:t>
             </a:fld>
             <a:endParaRPr lang="en-US"/>
           </a:p>
@@ -1605,7 +1614,7 @@
           <a:p>
             <a:fld id="{3FA9CB7B-DC52-4E63-8520-2B2B3A0CCB2D}" type="datetimeFigureOut">
               <a:rPr lang="en-US" smtClean="0"/>
-              <a:t>6/8/2021</a:t>
+              <a:t>6/9/2021</a:t>
             </a:fld>
             <a:endParaRPr lang="en-US"/>
           </a:p>
@@ -1723,7 +1732,7 @@
           <a:p>
             <a:fld id="{3FA9CB7B-DC52-4E63-8520-2B2B3A0CCB2D}" type="datetimeFigureOut">
               <a:rPr lang="en-US" smtClean="0"/>
-              <a:t>6/8/2021</a:t>
+              <a:t>6/9/2021</a:t>
             </a:fld>
             <a:endParaRPr lang="en-US"/>
           </a:p>
@@ -1818,7 +1827,7 @@
           <a:p>
             <a:fld id="{3FA9CB7B-DC52-4E63-8520-2B2B3A0CCB2D}" type="datetimeFigureOut">
               <a:rPr lang="en-US" smtClean="0"/>
-              <a:t>6/8/2021</a:t>
+              <a:t>6/9/2021</a:t>
             </a:fld>
             <a:endParaRPr lang="en-US"/>
           </a:p>
@@ -2095,7 +2104,7 @@
           <a:p>
             <a:fld id="{3FA9CB7B-DC52-4E63-8520-2B2B3A0CCB2D}" type="datetimeFigureOut">
               <a:rPr lang="en-US" smtClean="0"/>
-              <a:t>6/8/2021</a:t>
+              <a:t>6/9/2021</a:t>
             </a:fld>
             <a:endParaRPr lang="en-US"/>
           </a:p>
@@ -2348,7 +2357,7 @@
           <a:p>
             <a:fld id="{3FA9CB7B-DC52-4E63-8520-2B2B3A0CCB2D}" type="datetimeFigureOut">
               <a:rPr lang="en-US" smtClean="0"/>
-              <a:t>6/8/2021</a:t>
+              <a:t>6/9/2021</a:t>
             </a:fld>
             <a:endParaRPr lang="en-US"/>
           </a:p>
@@ -2561,7 +2570,7 @@
           <a:p>
             <a:fld id="{3FA9CB7B-DC52-4E63-8520-2B2B3A0CCB2D}" type="datetimeFigureOut">
               <a:rPr lang="en-US" smtClean="0"/>
-              <a:t>6/8/2021</a:t>
+              <a:t>6/9/2021</a:t>
             </a:fld>
             <a:endParaRPr lang="en-US"/>
           </a:p>
@@ -2974,10 +2983,10 @@
         </p:nvGrpSpPr>
         <p:grpSpPr>
           <a:xfrm>
-            <a:off x="266007" y="0"/>
-            <a:ext cx="9152313" cy="4571297"/>
-            <a:chOff x="2734887" y="847898"/>
-            <a:chExt cx="9152313" cy="4571297"/>
+            <a:off x="1621224" y="236220"/>
+            <a:ext cx="9145836" cy="4827515"/>
+            <a:chOff x="2528004" y="847898"/>
+            <a:chExt cx="9145836" cy="4827515"/>
           </a:xfrm>
         </p:grpSpPr>
         <p:grpSp>
@@ -2988,10 +2997,10 @@
           </p:nvGrpSpPr>
           <p:grpSpPr>
             <a:xfrm>
-              <a:off x="2735082" y="1172093"/>
-              <a:ext cx="9152118" cy="4247102"/>
-              <a:chOff x="232951" y="166253"/>
-              <a:chExt cx="9152118" cy="4247102"/>
+              <a:off x="2528004" y="847898"/>
+              <a:ext cx="9145836" cy="4827515"/>
+              <a:chOff x="25873" y="-157942"/>
+              <a:chExt cx="9145836" cy="4827515"/>
             </a:xfrm>
           </p:grpSpPr>
           <p:grpSp>
@@ -3002,10 +3011,10 @@
             </p:nvGrpSpPr>
             <p:grpSpPr>
               <a:xfrm>
-                <a:off x="4746567" y="182880"/>
-                <a:ext cx="4638502" cy="2011216"/>
-                <a:chOff x="476845" y="1296785"/>
-                <a:chExt cx="13196817" cy="4877447"/>
+                <a:off x="4459649" y="182880"/>
+                <a:ext cx="4712060" cy="2095632"/>
+                <a:chOff x="-339454" y="1296785"/>
+                <a:chExt cx="13406094" cy="5082166"/>
               </a:xfrm>
             </p:grpSpPr>
             <p:pic>
@@ -3040,8 +3049,8 @@
               </p:nvSpPr>
               <p:spPr>
                 <a:xfrm rot="16200000">
-                  <a:off x="-307506" y="4704949"/>
-                  <a:ext cx="1814921" cy="246220"/>
+                  <a:off x="-1646737" y="2697806"/>
+                  <a:ext cx="4103158" cy="1488592"/>
                 </a:xfrm>
                 <a:prstGeom prst="rect">
                   <a:avLst/>
@@ -3055,10 +3064,22 @@
                 <a:lstStyle/>
                 <a:p>
                   <a:r>
-                    <a:rPr lang="en-US" sz="1000" dirty="0" smtClean="0"/>
-                    <a:t>CNN Learned Filters (128 Total)</a:t>
+                    <a:rPr lang="en-US" sz="1400" b="1" dirty="0" smtClean="0"/>
+                    <a:t>CNN Learned Filters </a:t>
                   </a:r>
-                  <a:endParaRPr lang="en-US" sz="1000" dirty="0"/>
+                  <a:endParaRPr lang="en-US" sz="1400" b="1" dirty="0" smtClean="0"/>
+                </a:p>
+                <a:p>
+                  <a:pPr algn="ctr"/>
+                  <a:r>
+                    <a:rPr lang="en-US" sz="1400" b="1" dirty="0" smtClean="0"/>
+                    <a:t>(</a:t>
+                  </a:r>
+                  <a:r>
+                    <a:rPr lang="en-US" sz="1400" b="1" dirty="0" smtClean="0"/>
+                    <a:t>128 Total)</a:t>
+                  </a:r>
+                  <a:endParaRPr lang="en-US" sz="1400" b="1" dirty="0"/>
                 </a:p>
               </p:txBody>
             </p:sp>
@@ -3070,8 +3091,8 @@
               </p:nvSpPr>
               <p:spPr>
                 <a:xfrm>
-                  <a:off x="1965113" y="5577116"/>
-                  <a:ext cx="11708549" cy="597116"/>
+                  <a:off x="1358091" y="5632554"/>
+                  <a:ext cx="11708549" cy="746397"/>
                 </a:xfrm>
                 <a:prstGeom prst="rect">
                   <a:avLst/>
@@ -3085,10 +3106,18 @@
                 <a:lstStyle/>
                 <a:p>
                   <a:r>
-                    <a:rPr lang="en-US" sz="1000" dirty="0" smtClean="0"/>
-                    <a:t>Power Spectral Coefficient (30,563 Coefficients Total)</a:t>
+                    <a:rPr lang="en-US" sz="1400" b="1" dirty="0" smtClean="0"/>
+                    <a:t>Power Spectral Coefficient (30,563 </a:t>
                   </a:r>
-                  <a:endParaRPr lang="en-US" sz="1000" dirty="0"/>
+                  <a:r>
+                    <a:rPr lang="en-US" sz="1400" b="1" dirty="0" smtClean="0"/>
+                    <a:t>Total</a:t>
+                  </a:r>
+                  <a:r>
+                    <a:rPr lang="en-US" sz="1400" b="1" dirty="0" smtClean="0"/>
+                    <a:t>)</a:t>
+                  </a:r>
+                  <a:endParaRPr lang="en-US" sz="1400" b="1" dirty="0"/>
                 </a:p>
               </p:txBody>
             </p:sp>
@@ -3101,10 +3130,10 @@
             </p:nvGrpSpPr>
             <p:grpSpPr>
               <a:xfrm>
-                <a:off x="232951" y="166253"/>
-                <a:ext cx="5727274" cy="2083336"/>
-                <a:chOff x="1147351" y="1064027"/>
-                <a:chExt cx="5727274" cy="2083336"/>
+                <a:off x="25873" y="-157942"/>
+                <a:ext cx="5393332" cy="2423367"/>
+                <a:chOff x="940273" y="739832"/>
+                <a:chExt cx="5393332" cy="2423367"/>
               </a:xfrm>
             </p:grpSpPr>
             <p:pic>
@@ -3139,8 +3168,8 @@
               </p:nvSpPr>
               <p:spPr>
                 <a:xfrm>
-                  <a:off x="2360814" y="2901142"/>
-                  <a:ext cx="4513811" cy="246221"/>
+                  <a:off x="1819794" y="2855422"/>
+                  <a:ext cx="4513811" cy="307777"/>
                 </a:xfrm>
                 <a:prstGeom prst="rect">
                   <a:avLst/>
@@ -3154,10 +3183,10 @@
                 <a:lstStyle/>
                 <a:p>
                   <a:r>
-                    <a:rPr lang="en-US" sz="1000" dirty="0" smtClean="0"/>
+                    <a:rPr lang="en-US" sz="1400" b="1" dirty="0" smtClean="0"/>
                     <a:t>Power Spectral Coefficient (30,563 Total)</a:t>
                   </a:r>
-                  <a:endParaRPr lang="en-US" sz="1000" dirty="0"/>
+                  <a:endParaRPr lang="en-US" sz="1400" b="1" dirty="0"/>
                 </a:p>
               </p:txBody>
             </p:sp>
@@ -3169,8 +3198,8 @@
               </p:nvSpPr>
               <p:spPr>
                 <a:xfrm rot="16200000">
-                  <a:off x="349232" y="1862146"/>
-                  <a:ext cx="1842460" cy="246221"/>
+                  <a:off x="19495" y="1660610"/>
+                  <a:ext cx="2364775" cy="523220"/>
                 </a:xfrm>
                 <a:prstGeom prst="rect">
                   <a:avLst/>
@@ -3183,11 +3212,24 @@
                 </a:bodyPr>
                 <a:lstStyle/>
                 <a:p>
+                  <a:pPr algn="ctr"/>
                   <a:r>
-                    <a:rPr lang="en-US" sz="1000" dirty="0" smtClean="0"/>
-                    <a:t>Sequence Number (1,397 Total)</a:t>
+                    <a:rPr lang="en-US" sz="1400" b="1" dirty="0" smtClean="0"/>
+                    <a:t>Sequence Number </a:t>
                   </a:r>
-                  <a:endParaRPr lang="en-US" sz="1000" dirty="0"/>
+                  <a:endParaRPr lang="en-US" sz="1400" b="1" dirty="0" smtClean="0"/>
+                </a:p>
+                <a:p>
+                  <a:pPr algn="ctr"/>
+                  <a:r>
+                    <a:rPr lang="en-US" sz="1400" b="1" dirty="0" smtClean="0"/>
+                    <a:t>(</a:t>
+                  </a:r>
+                  <a:r>
+                    <a:rPr lang="en-US" sz="1400" b="1" dirty="0" smtClean="0"/>
+                    <a:t>1,397 Total)</a:t>
+                  </a:r>
+                  <a:endParaRPr lang="en-US" sz="1400" b="1" dirty="0"/>
                 </a:p>
               </p:txBody>
             </p:sp>
@@ -3200,10 +3242,10 @@
             </p:nvGrpSpPr>
             <p:grpSpPr>
               <a:xfrm>
-                <a:off x="252346" y="2346959"/>
-                <a:ext cx="4284340" cy="2066396"/>
-                <a:chOff x="252346" y="2346959"/>
-                <a:chExt cx="4284340" cy="2066396"/>
+                <a:off x="30027" y="2232659"/>
+                <a:ext cx="4506659" cy="2219392"/>
+                <a:chOff x="30027" y="2232659"/>
+                <a:chExt cx="4506659" cy="2219392"/>
               </a:xfrm>
             </p:grpSpPr>
             <p:pic>
@@ -3238,8 +3280,8 @@
               </p:nvSpPr>
               <p:spPr>
                 <a:xfrm rot="16200000">
-                  <a:off x="-545773" y="3145078"/>
-                  <a:ext cx="1842460" cy="246221"/>
+                  <a:off x="-629593" y="2892279"/>
+                  <a:ext cx="1842460" cy="523220"/>
                 </a:xfrm>
                 <a:prstGeom prst="rect">
                   <a:avLst/>
@@ -3252,11 +3294,24 @@
                 </a:bodyPr>
                 <a:lstStyle/>
                 <a:p>
+                  <a:pPr algn="ctr"/>
                   <a:r>
-                    <a:rPr lang="en-US" sz="1000" dirty="0" smtClean="0"/>
-                    <a:t>Sequence Number (1,397 Total)</a:t>
+                    <a:rPr lang="en-US" sz="1400" b="1" dirty="0" smtClean="0"/>
+                    <a:t>Sequence Number </a:t>
                   </a:r>
-                  <a:endParaRPr lang="en-US" sz="1000" dirty="0"/>
+                  <a:endParaRPr lang="en-US" sz="1400" b="1" dirty="0" smtClean="0"/>
+                </a:p>
+                <a:p>
+                  <a:pPr algn="ctr"/>
+                  <a:r>
+                    <a:rPr lang="en-US" sz="1400" b="1" dirty="0" smtClean="0"/>
+                    <a:t>(</a:t>
+                  </a:r>
+                  <a:r>
+                    <a:rPr lang="en-US" sz="1400" b="1" dirty="0" smtClean="0"/>
+                    <a:t>1,397 Total)</a:t>
+                  </a:r>
+                  <a:endParaRPr lang="en-US" sz="1400" b="1" dirty="0"/>
                 </a:p>
               </p:txBody>
             </p:sp>
@@ -3268,8 +3323,8 @@
               </p:nvSpPr>
               <p:spPr>
                 <a:xfrm>
-                  <a:off x="1375959" y="4167134"/>
-                  <a:ext cx="2539478" cy="246221"/>
+                  <a:off x="735879" y="4144274"/>
+                  <a:ext cx="3510513" cy="307777"/>
                 </a:xfrm>
                 <a:prstGeom prst="rect">
                   <a:avLst/>
@@ -3283,10 +3338,10 @@
                 <a:lstStyle/>
                 <a:p>
                   <a:r>
-                    <a:rPr lang="en-US" sz="1000" dirty="0" smtClean="0"/>
+                    <a:rPr lang="en-US" sz="1400" b="1" dirty="0" smtClean="0"/>
                     <a:t>CNN Learned Filtered Coefficients (128 Total)</a:t>
                   </a:r>
-                  <a:endParaRPr lang="en-US" sz="1000" dirty="0"/>
+                  <a:endParaRPr lang="en-US" sz="1400" b="1" dirty="0"/>
                 </a:p>
               </p:txBody>
             </p:sp>
@@ -3299,10 +3354,10 @@
             </p:nvGrpSpPr>
             <p:grpSpPr>
               <a:xfrm>
-                <a:off x="4743991" y="2341417"/>
-                <a:ext cx="3626926" cy="2066397"/>
-                <a:chOff x="4743991" y="2341417"/>
-                <a:chExt cx="3626926" cy="2066397"/>
+                <a:off x="4460712" y="2318557"/>
+                <a:ext cx="4183012" cy="2351016"/>
+                <a:chOff x="4460712" y="2318557"/>
+                <a:chExt cx="4183012" cy="2351016"/>
               </a:xfrm>
             </p:grpSpPr>
             <p:pic>
@@ -3337,8 +3392,8 @@
               </p:nvSpPr>
               <p:spPr>
                 <a:xfrm>
-                  <a:off x="5102831" y="4161593"/>
-                  <a:ext cx="3248005" cy="246221"/>
+                  <a:off x="4874231" y="4146353"/>
+                  <a:ext cx="3769493" cy="523220"/>
                 </a:xfrm>
                 <a:prstGeom prst="rect">
                   <a:avLst/>
@@ -3351,11 +3406,24 @@
                 </a:bodyPr>
                 <a:lstStyle/>
                 <a:p>
+                  <a:pPr algn="ctr"/>
                   <a:r>
-                    <a:rPr lang="en-US" sz="1000" dirty="0" smtClean="0"/>
-                    <a:t>Max Variance CNN Learned Filtered Coefficients (20 Total)</a:t>
+                    <a:rPr lang="en-US" sz="1400" b="1" dirty="0" smtClean="0"/>
+                    <a:t>Max Variance CNN Learned Filtered Coefficients </a:t>
                   </a:r>
-                  <a:endParaRPr lang="en-US" sz="1000" dirty="0"/>
+                  <a:endParaRPr lang="en-US" sz="1400" b="1" dirty="0" smtClean="0"/>
+                </a:p>
+                <a:p>
+                  <a:pPr algn="ctr"/>
+                  <a:r>
+                    <a:rPr lang="en-US" sz="1400" b="1" dirty="0" smtClean="0"/>
+                    <a:t>(</a:t>
+                  </a:r>
+                  <a:r>
+                    <a:rPr lang="en-US" sz="1400" b="1" dirty="0" smtClean="0"/>
+                    <a:t>20 Total)</a:t>
+                  </a:r>
+                  <a:endParaRPr lang="en-US" sz="1400" b="1" dirty="0"/>
                 </a:p>
               </p:txBody>
             </p:sp>
@@ -3367,8 +3435,8 @@
               </p:nvSpPr>
               <p:spPr>
                 <a:xfrm rot="16200000">
-                  <a:off x="3945872" y="3139536"/>
-                  <a:ext cx="1842460" cy="246221"/>
+                  <a:off x="3801092" y="2978177"/>
+                  <a:ext cx="1842460" cy="523220"/>
                 </a:xfrm>
                 <a:prstGeom prst="rect">
                   <a:avLst/>
@@ -3381,11 +3449,24 @@
                 </a:bodyPr>
                 <a:lstStyle/>
                 <a:p>
+                  <a:pPr algn="ctr"/>
                   <a:r>
-                    <a:rPr lang="en-US" sz="1000" dirty="0" smtClean="0"/>
-                    <a:t>Sequence Number (1,397 Total)</a:t>
+                    <a:rPr lang="en-US" sz="1400" b="1" dirty="0" smtClean="0"/>
+                    <a:t>Sequence Number </a:t>
                   </a:r>
-                  <a:endParaRPr lang="en-US" sz="1000" dirty="0"/>
+                  <a:endParaRPr lang="en-US" sz="1400" b="1" dirty="0" smtClean="0"/>
+                </a:p>
+                <a:p>
+                  <a:pPr algn="ctr"/>
+                  <a:r>
+                    <a:rPr lang="en-US" sz="1400" b="1" dirty="0" smtClean="0"/>
+                    <a:t>(</a:t>
+                  </a:r>
+                  <a:r>
+                    <a:rPr lang="en-US" sz="1400" b="1" dirty="0" smtClean="0"/>
+                    <a:t>1,397 Total)</a:t>
+                  </a:r>
+                  <a:endParaRPr lang="en-US" sz="1400" b="1" dirty="0"/>
                 </a:p>
               </p:txBody>
             </p:sp>
@@ -3414,10 +3495,10 @@
             <a:lstStyle/>
             <a:p>
               <a:r>
-                <a:rPr lang="en-US" dirty="0" smtClean="0"/>
+                <a:rPr lang="en-US" b="1" dirty="0" smtClean="0"/>
                 <a:t>a)</a:t>
               </a:r>
-              <a:endParaRPr lang="en-US" dirty="0"/>
+              <a:endParaRPr lang="en-US" b="1" dirty="0"/>
             </a:p>
           </p:txBody>
         </p:sp>
@@ -3444,10 +3525,10 @@
             <a:lstStyle/>
             <a:p>
               <a:r>
-                <a:rPr lang="en-US" dirty="0" smtClean="0"/>
+                <a:rPr lang="en-US" b="1" dirty="0" smtClean="0"/>
                 <a:t>b)</a:t>
               </a:r>
-              <a:endParaRPr lang="en-US" dirty="0"/>
+              <a:endParaRPr lang="en-US" b="1" dirty="0"/>
             </a:p>
           </p:txBody>
         </p:sp>
@@ -3474,10 +3555,10 @@
             <a:lstStyle/>
             <a:p>
               <a:r>
-                <a:rPr lang="en-US" dirty="0" smtClean="0"/>
+                <a:rPr lang="en-US" b="1" dirty="0" smtClean="0"/>
                 <a:t>d)</a:t>
               </a:r>
-              <a:endParaRPr lang="en-US" dirty="0"/>
+              <a:endParaRPr lang="en-US" b="1" dirty="0"/>
             </a:p>
           </p:txBody>
         </p:sp>
@@ -3504,10 +3585,10 @@
             <a:lstStyle/>
             <a:p>
               <a:r>
-                <a:rPr lang="en-US" dirty="0" smtClean="0"/>
+                <a:rPr lang="en-US" b="1" dirty="0" smtClean="0"/>
                 <a:t>c)</a:t>
               </a:r>
-              <a:endParaRPr lang="en-US" dirty="0"/>
+              <a:endParaRPr lang="en-US" b="1" dirty="0"/>
             </a:p>
           </p:txBody>
         </p:sp>
@@ -3520,7 +3601,7 @@
         </p:nvSpPr>
         <p:spPr>
           <a:xfrm>
-            <a:off x="1064029" y="4788131"/>
+            <a:off x="1056409" y="5047211"/>
             <a:ext cx="7473141" cy="1200329"/>
           </a:xfrm>
           <a:prstGeom prst="rect">
@@ -3538,7 +3619,7 @@
               <a:buAutoNum type="alphaLcParenBoth"/>
             </a:pPr>
             <a:r>
-              <a:rPr lang="en-US" dirty="0" smtClean="0"/>
+              <a:rPr lang="en-US" b="1" dirty="0" smtClean="0"/>
               <a:t>The Full Data Image, all 1397 sequences PS (scaled)</a:t>
             </a:r>
           </a:p>
@@ -3547,7 +3628,7 @@
               <a:buAutoNum type="alphaLcParenBoth" startAt="2"/>
             </a:pPr>
             <a:r>
-              <a:rPr lang="en-US" dirty="0" smtClean="0"/>
+              <a:rPr lang="en-US" b="1" dirty="0" smtClean="0"/>
               <a:t>The 128 Filters learned by the 1D CNN </a:t>
             </a:r>
           </a:p>
@@ -3556,7 +3637,7 @@
               <a:buAutoNum type="alphaLcParenBoth" startAt="2"/>
             </a:pPr>
             <a:r>
-              <a:rPr lang="en-US" dirty="0" smtClean="0"/>
+              <a:rPr lang="en-US" b="1" dirty="0" smtClean="0"/>
               <a:t>The 128 Filters applied to the 1397 PS</a:t>
             </a:r>
           </a:p>
@@ -3565,10 +3646,10 @@
               <a:buAutoNum type="alphaLcParenBoth" startAt="2"/>
             </a:pPr>
             <a:r>
-              <a:rPr lang="en-US" dirty="0" smtClean="0"/>
+              <a:rPr lang="en-US" b="1" dirty="0" smtClean="0"/>
               <a:t>The top twenty highest variance filtered values from the CNN filters.</a:t>
             </a:r>
-            <a:endParaRPr lang="en-US" dirty="0"/>
+            <a:endParaRPr lang="en-US" b="1" dirty="0"/>
           </a:p>
         </p:txBody>
       </p:sp>
@@ -3616,6 +3697,196 @@
             <a:chExt cx="5735637" cy="1714500"/>
           </a:xfrm>
         </p:grpSpPr>
+        <mc:AlternateContent xmlns:mc="http://schemas.openxmlformats.org/markup-compatibility/2006">
+          <mc:Choice xmlns:a14="http://schemas.microsoft.com/office/drawing/2010/main" Requires="a14">
+            <p:sp>
+              <p:nvSpPr>
+                <p:cNvPr id="129" name="TextBox 128"/>
+                <p:cNvSpPr txBox="1"/>
+                <p:nvPr/>
+              </p:nvSpPr>
+              <p:spPr>
+                <a:xfrm>
+                  <a:off x="2689860" y="1304175"/>
+                  <a:ext cx="4290522" cy="1015663"/>
+                </a:xfrm>
+                <a:prstGeom prst="rect">
+                  <a:avLst/>
+                </a:prstGeom>
+                <a:noFill/>
+                <a:ln>
+                  <a:noFill/>
+                </a:ln>
+              </p:spPr>
+              <p:txBody>
+                <a:bodyPr wrap="square" rtlCol="0">
+                  <a:spAutoFit/>
+                </a:bodyPr>
+                <a:lstStyle/>
+                <a:p>
+                  <a:r>
+                    <a:rPr lang="en-US" sz="1000" dirty="0" smtClean="0">
+                      <a:solidFill>
+                        <a:schemeClr val="accent5"/>
+                      </a:solidFill>
+                    </a:rPr>
+                    <a:t>Filter </a:t>
+                  </a:r>
+                  <a:r>
+                    <a:rPr lang="en-US" sz="1000" dirty="0" smtClean="0">
+                      <a:solidFill>
+                        <a:schemeClr val="accent5"/>
+                      </a:solidFill>
+                    </a:rPr>
+                    <a:t>1   </a:t>
+                  </a:r>
+                  <a:r>
+                    <a:rPr lang="en-US" sz="1000" dirty="0" smtClean="0">
+                      <a:solidFill>
+                        <a:schemeClr val="accent6"/>
+                      </a:solidFill>
+                    </a:rPr>
+                    <a:t>Filter 2   </a:t>
+                  </a:r>
+                  <a:r>
+                    <a:rPr lang="en-US" sz="1000" dirty="0" smtClean="0">
+                      <a:solidFill>
+                        <a:srgbClr val="C00000"/>
+                      </a:solidFill>
+                    </a:rPr>
+                    <a:t>Filter</a:t>
+                  </a:r>
+                  <a:r>
+                    <a:rPr lang="en-US" sz="700" dirty="0" smtClean="0">
+                      <a:solidFill>
+                        <a:srgbClr val="C00000"/>
+                      </a:solidFill>
+                    </a:rPr>
+                    <a:t> </a:t>
+                  </a:r>
+                  <a:r>
+                    <a:rPr lang="en-US" sz="1000" dirty="0" smtClean="0">
+                      <a:solidFill>
+                        <a:srgbClr val="C00000"/>
+                      </a:solidFill>
+                    </a:rPr>
+                    <a:t>3   </a:t>
+                  </a:r>
+                  <a:r>
+                    <a:rPr lang="en-US" sz="1000" dirty="0" smtClean="0">
+                      <a:solidFill>
+                        <a:schemeClr val="accent4"/>
+                      </a:solidFill>
+                    </a:rPr>
+                    <a:t>Filter 4                            </a:t>
+                  </a:r>
+                  <a:r>
+                    <a:rPr lang="en-US" sz="1000" dirty="0" smtClean="0"/>
+                    <a:t>                                  </a:t>
+                  </a:r>
+                  <a:r>
+                    <a:rPr lang="en-US" sz="1000" dirty="0" smtClean="0">
+                      <a:solidFill>
+                        <a:srgbClr val="7030A0"/>
+                      </a:solidFill>
+                    </a:rPr>
+                    <a:t>Filter </a:t>
+                  </a:r>
+                  <a14:m>
+                    <m:oMath xmlns:m="http://schemas.openxmlformats.org/officeDocument/2006/math">
+                      <m:r>
+                        <a:rPr lang="en-US" sz="1000" i="1" dirty="0">
+                          <a:solidFill>
+                            <a:srgbClr val="7030A0"/>
+                          </a:solidFill>
+                          <a:latin typeface="Cambria Math" panose="02040503050406030204" pitchFamily="18" charset="0"/>
+                        </a:rPr>
+                        <m:t>𝑝</m:t>
+                      </m:r>
+                    </m:oMath>
+                  </a14:m>
+                  <a:endParaRPr lang="en-US" sz="1000" dirty="0">
+                    <a:solidFill>
+                      <a:srgbClr val="7030A0"/>
+                    </a:solidFill>
+                  </a:endParaRPr>
+                </a:p>
+                <a:p>
+                  <a:endParaRPr lang="en-US" sz="1000" dirty="0"/>
+                </a:p>
+                <a:p>
+                  <a:endParaRPr lang="en-US" sz="1000" dirty="0">
+                    <a:solidFill>
+                      <a:schemeClr val="accent4"/>
+                    </a:solidFill>
+                  </a:endParaRPr>
+                </a:p>
+                <a:p>
+                  <a:endParaRPr lang="en-US" sz="1000" dirty="0">
+                    <a:solidFill>
+                      <a:srgbClr val="C00000"/>
+                    </a:solidFill>
+                  </a:endParaRPr>
+                </a:p>
+                <a:p>
+                  <a:endParaRPr lang="en-US" sz="1000" dirty="0">
+                    <a:solidFill>
+                      <a:schemeClr val="accent6"/>
+                    </a:solidFill>
+                  </a:endParaRPr>
+                </a:p>
+                <a:p>
+                  <a:endParaRPr lang="en-US" sz="1000" dirty="0">
+                    <a:solidFill>
+                      <a:schemeClr val="accent5"/>
+                    </a:solidFill>
+                  </a:endParaRPr>
+                </a:p>
+              </p:txBody>
+            </p:sp>
+          </mc:Choice>
+          <mc:Fallback>
+            <p:sp>
+              <p:nvSpPr>
+                <p:cNvPr id="129" name="TextBox 128"/>
+                <p:cNvSpPr txBox="1">
+                  <a:spLocks noRot="1" noChangeAspect="1" noMove="1" noResize="1" noEditPoints="1" noAdjustHandles="1" noChangeArrowheads="1" noChangeShapeType="1" noTextEdit="1"/>
+                </p:cNvSpPr>
+                <p:nvPr/>
+              </p:nvSpPr>
+              <p:spPr>
+                <a:xfrm>
+                  <a:off x="2689860" y="1304175"/>
+                  <a:ext cx="4290522" cy="1015663"/>
+                </a:xfrm>
+                <a:prstGeom prst="rect">
+                  <a:avLst/>
+                </a:prstGeom>
+                <a:blipFill>
+                  <a:blip r:embed="rId2"/>
+                  <a:stretch>
+                    <a:fillRect/>
+                  </a:stretch>
+                </a:blipFill>
+                <a:ln>
+                  <a:noFill/>
+                </a:ln>
+              </p:spPr>
+              <p:txBody>
+                <a:bodyPr/>
+                <a:lstStyle/>
+                <a:p>
+                  <a:r>
+                    <a:rPr lang="en-US">
+                      <a:noFill/>
+                    </a:rPr>
+                    <a:t> </a:t>
+                  </a:r>
+                </a:p>
+              </p:txBody>
+            </p:sp>
+          </mc:Fallback>
+        </mc:AlternateContent>
         <p:grpSp>
           <p:nvGrpSpPr>
             <p:cNvPr id="84" name="Group 83"/>
@@ -3872,7 +4143,7 @@
             </p:nvSpPr>
             <p:spPr>
               <a:xfrm>
-                <a:off x="5130799" y="1139825"/>
+                <a:off x="4909343" y="1006475"/>
                 <a:ext cx="3278188" cy="369332"/>
               </a:xfrm>
               <a:prstGeom prst="rect">
@@ -4426,13 +4697,13 @@
             </p:nvSpPr>
             <p:spPr>
               <a:xfrm rot="5400000">
-                <a:off x="5879306" y="741367"/>
-                <a:ext cx="87313" cy="1404938"/>
+                <a:off x="5669079" y="636477"/>
+                <a:ext cx="84698" cy="1388269"/>
               </a:xfrm>
               <a:prstGeom prst="rightBrace">
                 <a:avLst>
                   <a:gd name="adj1" fmla="val 93269"/>
-                  <a:gd name="adj2" fmla="val 42109"/>
+                  <a:gd name="adj2" fmla="val 44553"/>
                 </a:avLst>
               </a:prstGeom>
               <a:ln>
@@ -4547,47 +4818,6 @@
             </p:txBody>
           </p:sp>
         </p:grpSp>
-        <p:sp>
-          <p:nvSpPr>
-            <p:cNvPr id="85" name="TextBox 84"/>
-            <p:cNvSpPr txBox="1"/>
-            <p:nvPr/>
-          </p:nvSpPr>
-          <p:spPr>
-            <a:xfrm>
-              <a:off x="4146550" y="1314450"/>
-              <a:ext cx="596900" cy="200055"/>
-            </a:xfrm>
-            <a:prstGeom prst="rect">
-              <a:avLst/>
-            </a:prstGeom>
-            <a:noFill/>
-            <a:ln>
-              <a:noFill/>
-            </a:ln>
-          </p:spPr>
-          <p:txBody>
-            <a:bodyPr wrap="square" rtlCol="0">
-              <a:spAutoFit/>
-            </a:bodyPr>
-            <a:lstStyle/>
-            <a:p>
-              <a:r>
-                <a:rPr lang="en-US" sz="700" dirty="0" smtClean="0">
-                  <a:solidFill>
-                    <a:schemeClr val="accent4"/>
-                  </a:solidFill>
-                </a:rPr>
-                <a:t>Filter 4</a:t>
-              </a:r>
-              <a:endParaRPr lang="en-US" sz="700" dirty="0">
-                <a:solidFill>
-                  <a:schemeClr val="accent4"/>
-                </a:solidFill>
-              </a:endParaRPr>
-            </a:p>
-          </p:txBody>
-        </p:sp>
         <p:cxnSp>
           <p:nvCxnSpPr>
             <p:cNvPr id="113" name="Straight Connector 112"/>
@@ -4598,9 +4828,9 @@
             <p:nvPr/>
           </p:nvCxnSpPr>
           <p:spPr>
-            <a:xfrm flipH="1">
-              <a:off x="5485606" y="1678786"/>
-              <a:ext cx="242627" cy="112707"/>
+            <a:xfrm>
+              <a:off x="5481454" y="1564254"/>
+              <a:ext cx="4152" cy="227239"/>
             </a:xfrm>
             <a:prstGeom prst="line">
               <a:avLst/>
@@ -4796,261 +5026,6 @@
             </a:fontRef>
           </p:style>
         </p:cxnSp>
-        <p:sp>
-          <p:nvSpPr>
-            <p:cNvPr id="127" name="TextBox 126"/>
-            <p:cNvSpPr txBox="1"/>
-            <p:nvPr/>
-          </p:nvSpPr>
-          <p:spPr>
-            <a:xfrm>
-              <a:off x="3708400" y="1314450"/>
-              <a:ext cx="596900" cy="200055"/>
-            </a:xfrm>
-            <a:prstGeom prst="rect">
-              <a:avLst/>
-            </a:prstGeom>
-            <a:noFill/>
-            <a:ln>
-              <a:noFill/>
-            </a:ln>
-          </p:spPr>
-          <p:txBody>
-            <a:bodyPr wrap="square" rtlCol="0">
-              <a:spAutoFit/>
-            </a:bodyPr>
-            <a:lstStyle/>
-            <a:p>
-              <a:r>
-                <a:rPr lang="en-US" sz="700" dirty="0" smtClean="0">
-                  <a:solidFill>
-                    <a:srgbClr val="C00000"/>
-                  </a:solidFill>
-                </a:rPr>
-                <a:t>Filter 3</a:t>
-              </a:r>
-              <a:endParaRPr lang="en-US" sz="700" dirty="0">
-                <a:solidFill>
-                  <a:srgbClr val="C00000"/>
-                </a:solidFill>
-              </a:endParaRPr>
-            </a:p>
-          </p:txBody>
-        </p:sp>
-        <p:sp>
-          <p:nvSpPr>
-            <p:cNvPr id="128" name="TextBox 127"/>
-            <p:cNvSpPr txBox="1"/>
-            <p:nvPr/>
-          </p:nvSpPr>
-          <p:spPr>
-            <a:xfrm>
-              <a:off x="3257550" y="1314450"/>
-              <a:ext cx="596900" cy="200055"/>
-            </a:xfrm>
-            <a:prstGeom prst="rect">
-              <a:avLst/>
-            </a:prstGeom>
-            <a:noFill/>
-            <a:ln>
-              <a:noFill/>
-            </a:ln>
-          </p:spPr>
-          <p:txBody>
-            <a:bodyPr wrap="square" rtlCol="0">
-              <a:spAutoFit/>
-            </a:bodyPr>
-            <a:lstStyle/>
-            <a:p>
-              <a:r>
-                <a:rPr lang="en-US" sz="700" dirty="0" smtClean="0">
-                  <a:solidFill>
-                    <a:schemeClr val="accent6"/>
-                  </a:solidFill>
-                </a:rPr>
-                <a:t>Filter 2</a:t>
-              </a:r>
-              <a:endParaRPr lang="en-US" sz="700" dirty="0">
-                <a:solidFill>
-                  <a:schemeClr val="accent6"/>
-                </a:solidFill>
-              </a:endParaRPr>
-            </a:p>
-          </p:txBody>
-        </p:sp>
-        <p:sp>
-          <p:nvSpPr>
-            <p:cNvPr id="129" name="TextBox 128"/>
-            <p:cNvSpPr txBox="1"/>
-            <p:nvPr/>
-          </p:nvSpPr>
-          <p:spPr>
-            <a:xfrm>
-              <a:off x="2781300" y="1320800"/>
-              <a:ext cx="596900" cy="200055"/>
-            </a:xfrm>
-            <a:prstGeom prst="rect">
-              <a:avLst/>
-            </a:prstGeom>
-            <a:noFill/>
-            <a:ln>
-              <a:noFill/>
-            </a:ln>
-          </p:spPr>
-          <p:txBody>
-            <a:bodyPr wrap="square" rtlCol="0">
-              <a:spAutoFit/>
-            </a:bodyPr>
-            <a:lstStyle/>
-            <a:p>
-              <a:r>
-                <a:rPr lang="en-US" sz="700" dirty="0" smtClean="0">
-                  <a:solidFill>
-                    <a:schemeClr val="accent5"/>
-                  </a:solidFill>
-                </a:rPr>
-                <a:t>Filter 1</a:t>
-              </a:r>
-              <a:endParaRPr lang="en-US" sz="700" dirty="0">
-                <a:solidFill>
-                  <a:schemeClr val="accent5"/>
-                </a:solidFill>
-              </a:endParaRPr>
-            </a:p>
-          </p:txBody>
-        </p:sp>
-        <p:sp>
-          <p:nvSpPr>
-            <p:cNvPr id="130" name="TextBox 129"/>
-            <p:cNvSpPr txBox="1"/>
-            <p:nvPr/>
-          </p:nvSpPr>
-          <p:spPr>
-            <a:xfrm>
-              <a:off x="4699000" y="1314450"/>
-              <a:ext cx="596900" cy="200055"/>
-            </a:xfrm>
-            <a:prstGeom prst="rect">
-              <a:avLst/>
-            </a:prstGeom>
-            <a:noFill/>
-            <a:ln>
-              <a:noFill/>
-            </a:ln>
-          </p:spPr>
-          <p:txBody>
-            <a:bodyPr wrap="square" rtlCol="0">
-              <a:spAutoFit/>
-            </a:bodyPr>
-            <a:lstStyle/>
-            <a:p>
-              <a:r>
-                <a:rPr lang="en-US" sz="700" dirty="0" smtClean="0"/>
-                <a:t>…</a:t>
-              </a:r>
-              <a:endParaRPr lang="en-US" sz="700" dirty="0"/>
-            </a:p>
-          </p:txBody>
-        </p:sp>
-        <mc:AlternateContent xmlns:mc="http://schemas.openxmlformats.org/markup-compatibility/2006">
-          <mc:Choice xmlns:a14="http://schemas.microsoft.com/office/drawing/2010/main" Requires="a14">
-            <p:sp>
-              <p:nvSpPr>
-                <p:cNvPr id="131" name="TextBox 130"/>
-                <p:cNvSpPr txBox="1"/>
-                <p:nvPr/>
-              </p:nvSpPr>
-              <p:spPr>
-                <a:xfrm>
-                  <a:off x="6229350" y="1295400"/>
-                  <a:ext cx="596900" cy="200055"/>
-                </a:xfrm>
-                <a:prstGeom prst="rect">
-                  <a:avLst/>
-                </a:prstGeom>
-                <a:noFill/>
-                <a:ln>
-                  <a:noFill/>
-                </a:ln>
-              </p:spPr>
-              <p:txBody>
-                <a:bodyPr wrap="square" rtlCol="0">
-                  <a:spAutoFit/>
-                </a:bodyPr>
-                <a:lstStyle/>
-                <a:p>
-                  <a:r>
-                    <a:rPr lang="en-US" sz="700" dirty="0" smtClean="0">
-                      <a:solidFill>
-                        <a:srgbClr val="7030A0"/>
-                      </a:solidFill>
-                    </a:rPr>
-                    <a:t>Filter </a:t>
-                  </a:r>
-                  <a14:m>
-                    <m:oMath xmlns:m="http://schemas.openxmlformats.org/officeDocument/2006/math">
-                      <m:r>
-                        <a:rPr lang="en-US" sz="700" i="1" dirty="0" smtClean="0">
-                          <a:solidFill>
-                            <a:srgbClr val="7030A0"/>
-                          </a:solidFill>
-                          <a:latin typeface="Cambria Math" panose="02040503050406030204" pitchFamily="18" charset="0"/>
-                        </a:rPr>
-                        <m:t>𝑝</m:t>
-                      </m:r>
-                    </m:oMath>
-                  </a14:m>
-                  <a:endParaRPr lang="en-US" sz="700" dirty="0">
-                    <a:solidFill>
-                      <a:srgbClr val="7030A0"/>
-                    </a:solidFill>
-                  </a:endParaRPr>
-                </a:p>
-              </p:txBody>
-            </p:sp>
-          </mc:Choice>
-          <mc:Fallback>
-            <p:sp>
-              <p:nvSpPr>
-                <p:cNvPr id="131" name="TextBox 130"/>
-                <p:cNvSpPr txBox="1">
-                  <a:spLocks noRot="1" noChangeAspect="1" noMove="1" noResize="1" noEditPoints="1" noAdjustHandles="1" noChangeArrowheads="1" noChangeShapeType="1" noTextEdit="1"/>
-                </p:cNvSpPr>
-                <p:nvPr/>
-              </p:nvSpPr>
-              <p:spPr>
-                <a:xfrm>
-                  <a:off x="6229350" y="1295400"/>
-                  <a:ext cx="596900" cy="200055"/>
-                </a:xfrm>
-                <a:prstGeom prst="rect">
-                  <a:avLst/>
-                </a:prstGeom>
-                <a:blipFill>
-                  <a:blip r:embed="rId2"/>
-                  <a:stretch>
-                    <a:fillRect b="-6061"/>
-                  </a:stretch>
-                </a:blipFill>
-                <a:ln>
-                  <a:noFill/>
-                </a:ln>
-              </p:spPr>
-              <p:txBody>
-                <a:bodyPr/>
-                <a:lstStyle/>
-                <a:p>
-                  <a:r>
-                    <a:rPr lang="en-US">
-                      <a:noFill/>
-                    </a:rPr>
-                    <a:t> </a:t>
-                  </a:r>
-                </a:p>
-              </p:txBody>
-            </p:sp>
-          </mc:Fallback>
-        </mc:AlternateContent>
       </p:grpSp>
     </p:spTree>
     <p:extLst>
@@ -5224,6 +5199,1224 @@
     <p:extLst>
       <p:ext uri="{BB962C8B-B14F-4D97-AF65-F5344CB8AC3E}">
         <p14:creationId xmlns:p14="http://schemas.microsoft.com/office/powerpoint/2010/main" val="1179316894"/>
+      </p:ext>
+    </p:extLst>
+  </p:cSld>
+  <p:clrMapOvr>
+    <a:masterClrMapping/>
+  </p:clrMapOvr>
+</p:sld>
+</file>
+
+<file path=ppt/slides/slide4.xml><?xml version="1.0" encoding="utf-8"?>
+<p:sld xmlns:a="http://schemas.openxmlformats.org/drawingml/2006/main" xmlns:r="http://schemas.openxmlformats.org/officeDocument/2006/relationships" xmlns:p="http://schemas.openxmlformats.org/presentationml/2006/main">
+  <p:cSld>
+    <p:spTree>
+      <p:nvGrpSpPr>
+        <p:cNvPr id="1" name=""/>
+        <p:cNvGrpSpPr/>
+        <p:nvPr/>
+      </p:nvGrpSpPr>
+      <p:grpSpPr>
+        <a:xfrm>
+          <a:off x="0" y="0"/>
+          <a:ext cx="0" cy="0"/>
+          <a:chOff x="0" y="0"/>
+          <a:chExt cx="0" cy="0"/>
+        </a:xfrm>
+      </p:grpSpPr>
+      <p:pic>
+        <p:nvPicPr>
+          <p:cNvPr id="4" name="Picture 3"/>
+          <p:cNvPicPr>
+            <a:picLocks noChangeAspect="1"/>
+          </p:cNvPicPr>
+          <p:nvPr/>
+        </p:nvPicPr>
+        <p:blipFill>
+          <a:blip r:embed="rId2"/>
+          <a:stretch>
+            <a:fillRect/>
+          </a:stretch>
+        </p:blipFill>
+        <p:spPr>
+          <a:xfrm>
+            <a:off x="587022" y="279400"/>
+            <a:ext cx="4956527" cy="2230437"/>
+          </a:xfrm>
+          <a:prstGeom prst="rect">
+            <a:avLst/>
+          </a:prstGeom>
+        </p:spPr>
+      </p:pic>
+    </p:spTree>
+    <p:extLst>
+      <p:ext uri="{BB962C8B-B14F-4D97-AF65-F5344CB8AC3E}">
+        <p14:creationId xmlns:p14="http://schemas.microsoft.com/office/powerpoint/2010/main" val="2440476537"/>
+      </p:ext>
+    </p:extLst>
+  </p:cSld>
+  <p:clrMapOvr>
+    <a:masterClrMapping/>
+  </p:clrMapOvr>
+</p:sld>
+</file>
+
+<file path=ppt/slides/slide5.xml><?xml version="1.0" encoding="utf-8"?>
+<p:sld xmlns:a="http://schemas.openxmlformats.org/drawingml/2006/main" xmlns:r="http://schemas.openxmlformats.org/officeDocument/2006/relationships" xmlns:p="http://schemas.openxmlformats.org/presentationml/2006/main">
+  <p:cSld>
+    <p:spTree>
+      <p:nvGrpSpPr>
+        <p:cNvPr id="1" name=""/>
+        <p:cNvGrpSpPr/>
+        <p:nvPr/>
+      </p:nvGrpSpPr>
+      <p:grpSpPr>
+        <a:xfrm>
+          <a:off x="0" y="0"/>
+          <a:ext cx="0" cy="0"/>
+          <a:chOff x="0" y="0"/>
+          <a:chExt cx="0" cy="0"/>
+        </a:xfrm>
+      </p:grpSpPr>
+      <p:grpSp>
+        <p:nvGrpSpPr>
+          <p:cNvPr id="14" name="Group 13"/>
+          <p:cNvGrpSpPr/>
+          <p:nvPr/>
+        </p:nvGrpSpPr>
+        <p:grpSpPr>
+          <a:xfrm>
+            <a:off x="0" y="0"/>
+            <a:ext cx="11867243" cy="6580415"/>
+            <a:chOff x="223157" y="277585"/>
+            <a:chExt cx="11867243" cy="6580415"/>
+          </a:xfrm>
+        </p:grpSpPr>
+        <p:pic>
+          <p:nvPicPr>
+            <p:cNvPr id="4" name="Picture 3"/>
+            <p:cNvPicPr>
+              <a:picLocks noChangeAspect="1"/>
+            </p:cNvPicPr>
+            <p:nvPr/>
+          </p:nvPicPr>
+          <p:blipFill>
+            <a:blip r:embed="rId2" cstate="print">
+              <a:extLst>
+                <a:ext uri="{28A0092B-C50C-407E-A947-70E740481C1C}">
+                  <a14:useLocalDpi xmlns:a14="http://schemas.microsoft.com/office/drawing/2010/main" val="0"/>
+                </a:ext>
+              </a:extLst>
+            </a:blip>
+            <a:stretch>
+              <a:fillRect/>
+            </a:stretch>
+          </p:blipFill>
+          <p:spPr>
+            <a:xfrm>
+              <a:off x="286656" y="785585"/>
+              <a:ext cx="5766486" cy="2889250"/>
+            </a:xfrm>
+            <a:prstGeom prst="rect">
+              <a:avLst/>
+            </a:prstGeom>
+          </p:spPr>
+        </p:pic>
+        <p:pic>
+          <p:nvPicPr>
+            <p:cNvPr id="5" name="Picture 4"/>
+            <p:cNvPicPr>
+              <a:picLocks noChangeAspect="1"/>
+            </p:cNvPicPr>
+            <p:nvPr/>
+          </p:nvPicPr>
+          <p:blipFill>
+            <a:blip r:embed="rId3" cstate="print">
+              <a:extLst>
+                <a:ext uri="{28A0092B-C50C-407E-A947-70E740481C1C}">
+                  <a14:useLocalDpi xmlns:a14="http://schemas.microsoft.com/office/drawing/2010/main" val="0"/>
+                </a:ext>
+              </a:extLst>
+            </a:blip>
+            <a:stretch>
+              <a:fillRect/>
+            </a:stretch>
+          </p:blipFill>
+          <p:spPr>
+            <a:xfrm>
+              <a:off x="6222102" y="798285"/>
+              <a:ext cx="5665098" cy="2838450"/>
+            </a:xfrm>
+            <a:prstGeom prst="rect">
+              <a:avLst/>
+            </a:prstGeom>
+          </p:spPr>
+        </p:pic>
+        <p:pic>
+          <p:nvPicPr>
+            <p:cNvPr id="6" name="Picture 5"/>
+            <p:cNvPicPr>
+              <a:picLocks noChangeAspect="1"/>
+            </p:cNvPicPr>
+            <p:nvPr/>
+          </p:nvPicPr>
+          <p:blipFill>
+            <a:blip r:embed="rId4" cstate="print">
+              <a:extLst>
+                <a:ext uri="{28A0092B-C50C-407E-A947-70E740481C1C}">
+                  <a14:useLocalDpi xmlns:a14="http://schemas.microsoft.com/office/drawing/2010/main" val="0"/>
+                </a:ext>
+              </a:extLst>
+            </a:blip>
+            <a:stretch>
+              <a:fillRect/>
+            </a:stretch>
+          </p:blipFill>
+          <p:spPr>
+            <a:xfrm>
+              <a:off x="223157" y="3930915"/>
+              <a:ext cx="5842000" cy="2927085"/>
+            </a:xfrm>
+            <a:prstGeom prst="rect">
+              <a:avLst/>
+            </a:prstGeom>
+          </p:spPr>
+        </p:pic>
+        <p:pic>
+          <p:nvPicPr>
+            <p:cNvPr id="7" name="Picture 6"/>
+            <p:cNvPicPr>
+              <a:picLocks noChangeAspect="1"/>
+            </p:cNvPicPr>
+            <p:nvPr/>
+          </p:nvPicPr>
+          <p:blipFill>
+            <a:blip r:embed="rId5" cstate="print">
+              <a:extLst>
+                <a:ext uri="{28A0092B-C50C-407E-A947-70E740481C1C}">
+                  <a14:useLocalDpi xmlns:a14="http://schemas.microsoft.com/office/drawing/2010/main" val="0"/>
+                </a:ext>
+              </a:extLst>
+            </a:blip>
+            <a:stretch>
+              <a:fillRect/>
+            </a:stretch>
+          </p:blipFill>
+          <p:spPr>
+            <a:xfrm>
+              <a:off x="6399955" y="4006850"/>
+              <a:ext cx="5690445" cy="2851150"/>
+            </a:xfrm>
+            <a:prstGeom prst="rect">
+              <a:avLst/>
+            </a:prstGeom>
+          </p:spPr>
+        </p:pic>
+        <p:sp>
+          <p:nvSpPr>
+            <p:cNvPr id="9" name="TextBox 8"/>
+            <p:cNvSpPr txBox="1"/>
+            <p:nvPr/>
+          </p:nvSpPr>
+          <p:spPr>
+            <a:xfrm>
+              <a:off x="844763" y="277585"/>
+              <a:ext cx="556952" cy="369332"/>
+            </a:xfrm>
+            <a:prstGeom prst="rect">
+              <a:avLst/>
+            </a:prstGeom>
+            <a:noFill/>
+          </p:spPr>
+          <p:txBody>
+            <a:bodyPr wrap="square" rtlCol="0">
+              <a:spAutoFit/>
+            </a:bodyPr>
+            <a:lstStyle/>
+            <a:p>
+              <a:r>
+                <a:rPr lang="en-US" dirty="0" smtClean="0"/>
+                <a:t>a)</a:t>
+              </a:r>
+              <a:endParaRPr lang="en-US" dirty="0"/>
+            </a:p>
+          </p:txBody>
+        </p:sp>
+        <p:sp>
+          <p:nvSpPr>
+            <p:cNvPr id="10" name="TextBox 9"/>
+            <p:cNvSpPr txBox="1"/>
+            <p:nvPr/>
+          </p:nvSpPr>
+          <p:spPr>
+            <a:xfrm>
+              <a:off x="6242263" y="404585"/>
+              <a:ext cx="556952" cy="369332"/>
+            </a:xfrm>
+            <a:prstGeom prst="rect">
+              <a:avLst/>
+            </a:prstGeom>
+            <a:noFill/>
+          </p:spPr>
+          <p:txBody>
+            <a:bodyPr wrap="square" rtlCol="0">
+              <a:spAutoFit/>
+            </a:bodyPr>
+            <a:lstStyle/>
+            <a:p>
+              <a:r>
+                <a:rPr lang="en-US" dirty="0" smtClean="0"/>
+                <a:t>b)</a:t>
+              </a:r>
+              <a:endParaRPr lang="en-US" dirty="0"/>
+            </a:p>
+          </p:txBody>
+        </p:sp>
+        <p:sp>
+          <p:nvSpPr>
+            <p:cNvPr id="11" name="TextBox 10"/>
+            <p:cNvSpPr txBox="1"/>
+            <p:nvPr/>
+          </p:nvSpPr>
+          <p:spPr>
+            <a:xfrm>
+              <a:off x="882863" y="3389085"/>
+              <a:ext cx="556952" cy="369332"/>
+            </a:xfrm>
+            <a:prstGeom prst="rect">
+              <a:avLst/>
+            </a:prstGeom>
+            <a:noFill/>
+          </p:spPr>
+          <p:txBody>
+            <a:bodyPr wrap="square" rtlCol="0">
+              <a:spAutoFit/>
+            </a:bodyPr>
+            <a:lstStyle/>
+            <a:p>
+              <a:r>
+                <a:rPr lang="en-US" dirty="0" smtClean="0"/>
+                <a:t>c)</a:t>
+              </a:r>
+              <a:endParaRPr lang="en-US" dirty="0"/>
+            </a:p>
+          </p:txBody>
+        </p:sp>
+        <p:sp>
+          <p:nvSpPr>
+            <p:cNvPr id="12" name="TextBox 11"/>
+            <p:cNvSpPr txBox="1"/>
+            <p:nvPr/>
+          </p:nvSpPr>
+          <p:spPr>
+            <a:xfrm>
+              <a:off x="6229563" y="3389085"/>
+              <a:ext cx="556952" cy="369332"/>
+            </a:xfrm>
+            <a:prstGeom prst="rect">
+              <a:avLst/>
+            </a:prstGeom>
+            <a:noFill/>
+          </p:spPr>
+          <p:txBody>
+            <a:bodyPr wrap="square" rtlCol="0">
+              <a:spAutoFit/>
+            </a:bodyPr>
+            <a:lstStyle/>
+            <a:p>
+              <a:r>
+                <a:rPr lang="en-US" dirty="0" smtClean="0"/>
+                <a:t>d)</a:t>
+              </a:r>
+              <a:endParaRPr lang="en-US" dirty="0"/>
+            </a:p>
+          </p:txBody>
+        </p:sp>
+      </p:grpSp>
+    </p:spTree>
+    <p:extLst>
+      <p:ext uri="{BB962C8B-B14F-4D97-AF65-F5344CB8AC3E}">
+        <p14:creationId xmlns:p14="http://schemas.microsoft.com/office/powerpoint/2010/main" val="3229279774"/>
+      </p:ext>
+    </p:extLst>
+  </p:cSld>
+  <p:clrMapOvr>
+    <a:masterClrMapping/>
+  </p:clrMapOvr>
+</p:sld>
+</file>
+
+<file path=ppt/slides/slide6.xml><?xml version="1.0" encoding="utf-8"?>
+<p:sld xmlns:a="http://schemas.openxmlformats.org/drawingml/2006/main" xmlns:r="http://schemas.openxmlformats.org/officeDocument/2006/relationships" xmlns:p="http://schemas.openxmlformats.org/presentationml/2006/main">
+  <p:cSld>
+    <p:spTree>
+      <p:nvGrpSpPr>
+        <p:cNvPr id="1" name=""/>
+        <p:cNvGrpSpPr/>
+        <p:nvPr/>
+      </p:nvGrpSpPr>
+      <p:grpSpPr>
+        <a:xfrm>
+          <a:off x="0" y="0"/>
+          <a:ext cx="0" cy="0"/>
+          <a:chOff x="0" y="0"/>
+          <a:chExt cx="0" cy="0"/>
+        </a:xfrm>
+      </p:grpSpPr>
+      <p:grpSp>
+        <p:nvGrpSpPr>
+          <p:cNvPr id="26" name="Group 25"/>
+          <p:cNvGrpSpPr/>
+          <p:nvPr/>
+        </p:nvGrpSpPr>
+        <p:grpSpPr>
+          <a:xfrm>
+            <a:off x="0" y="0"/>
+            <a:ext cx="11757465" cy="6710104"/>
+            <a:chOff x="0" y="0"/>
+            <a:chExt cx="11757465" cy="6710104"/>
+          </a:xfrm>
+        </p:grpSpPr>
+        <p:grpSp>
+          <p:nvGrpSpPr>
+            <p:cNvPr id="21" name="Group 20"/>
+            <p:cNvGrpSpPr/>
+            <p:nvPr/>
+          </p:nvGrpSpPr>
+          <p:grpSpPr>
+            <a:xfrm>
+              <a:off x="0" y="0"/>
+              <a:ext cx="11635739" cy="6710104"/>
+              <a:chOff x="99061" y="152400"/>
+              <a:chExt cx="11635739" cy="6710104"/>
+            </a:xfrm>
+          </p:grpSpPr>
+          <p:grpSp>
+            <p:nvGrpSpPr>
+              <p:cNvPr id="17" name="Group 16"/>
+              <p:cNvGrpSpPr/>
+              <p:nvPr/>
+            </p:nvGrpSpPr>
+            <p:grpSpPr>
+              <a:xfrm>
+                <a:off x="99061" y="152400"/>
+                <a:ext cx="11635739" cy="6224051"/>
+                <a:chOff x="99061" y="152400"/>
+                <a:chExt cx="11635739" cy="6224051"/>
+              </a:xfrm>
+            </p:grpSpPr>
+            <p:grpSp>
+              <p:nvGrpSpPr>
+                <p:cNvPr id="15" name="Group 14"/>
+                <p:cNvGrpSpPr/>
+                <p:nvPr/>
+              </p:nvGrpSpPr>
+              <p:grpSpPr>
+                <a:xfrm>
+                  <a:off x="99061" y="152400"/>
+                  <a:ext cx="11635739" cy="3531878"/>
+                  <a:chOff x="396241" y="396240"/>
+                  <a:chExt cx="11635739" cy="3531878"/>
+                </a:xfrm>
+              </p:grpSpPr>
+              <p:grpSp>
+                <p:nvGrpSpPr>
+                  <p:cNvPr id="11" name="Group 10"/>
+                  <p:cNvGrpSpPr/>
+                  <p:nvPr/>
+                </p:nvGrpSpPr>
+                <p:grpSpPr>
+                  <a:xfrm>
+                    <a:off x="396241" y="396240"/>
+                    <a:ext cx="11635739" cy="3531878"/>
+                    <a:chOff x="396241" y="396240"/>
+                    <a:chExt cx="11635739" cy="3531878"/>
+                  </a:xfrm>
+                </p:grpSpPr>
+                <p:grpSp>
+                  <p:nvGrpSpPr>
+                    <p:cNvPr id="9" name="Group 8"/>
+                    <p:cNvGrpSpPr/>
+                    <p:nvPr/>
+                  </p:nvGrpSpPr>
+                  <p:grpSpPr>
+                    <a:xfrm>
+                      <a:off x="396241" y="396240"/>
+                      <a:ext cx="5879147" cy="3531878"/>
+                      <a:chOff x="1" y="373380"/>
+                      <a:chExt cx="5879147" cy="3531878"/>
+                    </a:xfrm>
+                  </p:grpSpPr>
+                  <p:pic>
+                    <p:nvPicPr>
+                      <p:cNvPr id="4" name="Picture 3"/>
+                      <p:cNvPicPr>
+                        <a:picLocks noChangeAspect="1"/>
+                      </p:cNvPicPr>
+                      <p:nvPr/>
+                    </p:nvPicPr>
+                    <p:blipFill>
+                      <a:blip r:embed="rId2"/>
+                      <a:stretch>
+                        <a:fillRect/>
+                      </a:stretch>
+                    </p:blipFill>
+                    <p:spPr>
+                      <a:xfrm>
+                        <a:off x="548639" y="777240"/>
+                        <a:ext cx="5330509" cy="2583180"/>
+                      </a:xfrm>
+                      <a:prstGeom prst="rect">
+                        <a:avLst/>
+                      </a:prstGeom>
+                    </p:spPr>
+                  </p:pic>
+                  <p:sp>
+                    <p:nvSpPr>
+                      <p:cNvPr id="5" name="TextBox 4"/>
+                      <p:cNvSpPr txBox="1"/>
+                      <p:nvPr/>
+                    </p:nvSpPr>
+                    <p:spPr>
+                      <a:xfrm rot="16200000">
+                        <a:off x="-920777" y="1736118"/>
+                        <a:ext cx="2364775" cy="523220"/>
+                      </a:xfrm>
+                      <a:prstGeom prst="rect">
+                        <a:avLst/>
+                      </a:prstGeom>
+                      <a:noFill/>
+                    </p:spPr>
+                    <p:txBody>
+                      <a:bodyPr wrap="square" rtlCol="0">
+                        <a:spAutoFit/>
+                      </a:bodyPr>
+                      <a:lstStyle/>
+                      <a:p>
+                        <a:pPr algn="ctr"/>
+                        <a:r>
+                          <a:rPr lang="en-US" sz="1400" b="1" dirty="0" smtClean="0"/>
+                          <a:t>Variance of PS Coefficient</a:t>
+                        </a:r>
+                      </a:p>
+                      <a:p>
+                        <a:pPr algn="ctr"/>
+                        <a:r>
+                          <a:rPr lang="en-US" sz="1400" b="1" dirty="0" smtClean="0"/>
+                          <a:t>(Sample 1,397)</a:t>
+                        </a:r>
+                        <a:endParaRPr lang="en-US" sz="1400" b="1" dirty="0"/>
+                      </a:p>
+                    </p:txBody>
+                  </p:sp>
+                  <p:sp>
+                    <p:nvSpPr>
+                      <p:cNvPr id="6" name="TextBox 5"/>
+                      <p:cNvSpPr txBox="1"/>
+                      <p:nvPr/>
+                    </p:nvSpPr>
+                    <p:spPr>
+                      <a:xfrm>
+                        <a:off x="2142463" y="3382038"/>
+                        <a:ext cx="2364775" cy="523220"/>
+                      </a:xfrm>
+                      <a:prstGeom prst="rect">
+                        <a:avLst/>
+                      </a:prstGeom>
+                      <a:noFill/>
+                    </p:spPr>
+                    <p:txBody>
+                      <a:bodyPr wrap="square" rtlCol="0">
+                        <a:spAutoFit/>
+                      </a:bodyPr>
+                      <a:lstStyle/>
+                      <a:p>
+                        <a:pPr algn="ctr"/>
+                        <a:r>
+                          <a:rPr lang="en-US" sz="1400" b="1" dirty="0" smtClean="0"/>
+                          <a:t>PS Coefficient Position (30,563 Total)</a:t>
+                        </a:r>
+                        <a:endParaRPr lang="en-US" sz="1400" b="1" dirty="0"/>
+                      </a:p>
+                    </p:txBody>
+                  </p:sp>
+                  <p:sp>
+                    <p:nvSpPr>
+                      <p:cNvPr id="8" name="TextBox 7"/>
+                      <p:cNvSpPr txBox="1"/>
+                      <p:nvPr/>
+                    </p:nvSpPr>
+                    <p:spPr>
+                      <a:xfrm>
+                        <a:off x="232986" y="373380"/>
+                        <a:ext cx="556952" cy="369332"/>
+                      </a:xfrm>
+                      <a:prstGeom prst="rect">
+                        <a:avLst/>
+                      </a:prstGeom>
+                      <a:noFill/>
+                    </p:spPr>
+                    <p:txBody>
+                      <a:bodyPr wrap="square" rtlCol="0">
+                        <a:spAutoFit/>
+                      </a:bodyPr>
+                      <a:lstStyle/>
+                      <a:p>
+                        <a:r>
+                          <a:rPr lang="en-US" dirty="0" smtClean="0"/>
+                          <a:t>a)</a:t>
+                        </a:r>
+                        <a:endParaRPr lang="en-US" dirty="0"/>
+                      </a:p>
+                    </p:txBody>
+                  </p:sp>
+                </p:grpSp>
+                <p:pic>
+                  <p:nvPicPr>
+                    <p:cNvPr id="10" name="Picture 9"/>
+                    <p:cNvPicPr>
+                      <a:picLocks noChangeAspect="1"/>
+                    </p:cNvPicPr>
+                    <p:nvPr/>
+                  </p:nvPicPr>
+                  <p:blipFill>
+                    <a:blip r:embed="rId3"/>
+                    <a:stretch>
+                      <a:fillRect/>
+                    </a:stretch>
+                  </p:blipFill>
+                  <p:spPr>
+                    <a:xfrm>
+                      <a:off x="6644641" y="708004"/>
+                      <a:ext cx="5387339" cy="2793246"/>
+                    </a:xfrm>
+                    <a:prstGeom prst="rect">
+                      <a:avLst/>
+                    </a:prstGeom>
+                  </p:spPr>
+                </p:pic>
+              </p:grpSp>
+              <p:sp>
+                <p:nvSpPr>
+                  <p:cNvPr id="12" name="TextBox 11"/>
+                  <p:cNvSpPr txBox="1"/>
+                  <p:nvPr/>
+                </p:nvSpPr>
+                <p:spPr>
+                  <a:xfrm>
+                    <a:off x="8284183" y="3404898"/>
+                    <a:ext cx="2364775" cy="523220"/>
+                  </a:xfrm>
+                  <a:prstGeom prst="rect">
+                    <a:avLst/>
+                  </a:prstGeom>
+                  <a:noFill/>
+                </p:spPr>
+                <p:txBody>
+                  <a:bodyPr wrap="square" rtlCol="0">
+                    <a:spAutoFit/>
+                  </a:bodyPr>
+                  <a:lstStyle/>
+                  <a:p>
+                    <a:pPr algn="ctr"/>
+                    <a:r>
+                      <a:rPr lang="en-US" sz="1400" b="1" dirty="0" smtClean="0"/>
+                      <a:t>Variance of PS Coefficient (Sample 1,397)</a:t>
+                    </a:r>
+                    <a:endParaRPr lang="en-US" sz="1400" b="1" dirty="0"/>
+                  </a:p>
+                </p:txBody>
+              </p:sp>
+              <p:sp>
+                <p:nvSpPr>
+                  <p:cNvPr id="13" name="TextBox 12"/>
+                  <p:cNvSpPr txBox="1"/>
+                  <p:nvPr/>
+                </p:nvSpPr>
+                <p:spPr>
+                  <a:xfrm rot="16200000">
+                    <a:off x="5243803" y="1758978"/>
+                    <a:ext cx="2364775" cy="523220"/>
+                  </a:xfrm>
+                  <a:prstGeom prst="rect">
+                    <a:avLst/>
+                  </a:prstGeom>
+                  <a:noFill/>
+                </p:spPr>
+                <p:txBody>
+                  <a:bodyPr wrap="square" rtlCol="0">
+                    <a:spAutoFit/>
+                  </a:bodyPr>
+                  <a:lstStyle/>
+                  <a:p>
+                    <a:pPr algn="ctr"/>
+                    <a:r>
+                      <a:rPr lang="en-US" sz="1400" b="1" dirty="0" smtClean="0"/>
+                      <a:t>Number of Coefficients (30,563 Total)</a:t>
+                    </a:r>
+                    <a:endParaRPr lang="en-US" sz="1400" b="1" dirty="0"/>
+                  </a:p>
+                </p:txBody>
+              </p:sp>
+              <p:sp>
+                <p:nvSpPr>
+                  <p:cNvPr id="14" name="TextBox 13"/>
+                  <p:cNvSpPr txBox="1"/>
+                  <p:nvPr/>
+                </p:nvSpPr>
+                <p:spPr>
+                  <a:xfrm>
+                    <a:off x="6351846" y="396240"/>
+                    <a:ext cx="556952" cy="369332"/>
+                  </a:xfrm>
+                  <a:prstGeom prst="rect">
+                    <a:avLst/>
+                  </a:prstGeom>
+                  <a:noFill/>
+                </p:spPr>
+                <p:txBody>
+                  <a:bodyPr wrap="square" rtlCol="0">
+                    <a:spAutoFit/>
+                  </a:bodyPr>
+                  <a:lstStyle/>
+                  <a:p>
+                    <a:r>
+                      <a:rPr lang="en-US" dirty="0" smtClean="0"/>
+                      <a:t>b)</a:t>
+                    </a:r>
+                    <a:endParaRPr lang="en-US" dirty="0"/>
+                  </a:p>
+                </p:txBody>
+              </p:sp>
+            </p:grpSp>
+            <p:pic>
+              <p:nvPicPr>
+                <p:cNvPr id="16" name="Picture 15"/>
+                <p:cNvPicPr>
+                  <a:picLocks noChangeAspect="1"/>
+                </p:cNvPicPr>
+                <p:nvPr/>
+              </p:nvPicPr>
+              <p:blipFill>
+                <a:blip r:embed="rId4"/>
+                <a:stretch>
+                  <a:fillRect/>
+                </a:stretch>
+              </p:blipFill>
+              <p:spPr>
+                <a:xfrm>
+                  <a:off x="614277" y="3739076"/>
+                  <a:ext cx="5379200" cy="2637375"/>
+                </a:xfrm>
+                <a:prstGeom prst="rect">
+                  <a:avLst/>
+                </a:prstGeom>
+              </p:spPr>
+            </p:pic>
+          </p:grpSp>
+          <p:sp>
+            <p:nvSpPr>
+              <p:cNvPr id="18" name="TextBox 17"/>
+              <p:cNvSpPr txBox="1"/>
+              <p:nvPr/>
+            </p:nvSpPr>
+            <p:spPr>
+              <a:xfrm>
+                <a:off x="2270628" y="6339284"/>
+                <a:ext cx="2364775" cy="523220"/>
+              </a:xfrm>
+              <a:prstGeom prst="rect">
+                <a:avLst/>
+              </a:prstGeom>
+              <a:noFill/>
+            </p:spPr>
+            <p:txBody>
+              <a:bodyPr wrap="square" rtlCol="0">
+                <a:spAutoFit/>
+              </a:bodyPr>
+              <a:lstStyle/>
+              <a:p>
+                <a:pPr algn="ctr"/>
+                <a:r>
+                  <a:rPr lang="en-US" sz="1400" b="1" dirty="0" smtClean="0"/>
+                  <a:t>Variance of PS Coefficient (Sample 1,397)</a:t>
+                </a:r>
+                <a:endParaRPr lang="en-US" sz="1400" b="1" dirty="0"/>
+              </a:p>
+            </p:txBody>
+          </p:sp>
+          <p:sp>
+            <p:nvSpPr>
+              <p:cNvPr id="19" name="TextBox 18"/>
+              <p:cNvSpPr txBox="1"/>
+              <p:nvPr/>
+            </p:nvSpPr>
+            <p:spPr>
+              <a:xfrm rot="16200000">
+                <a:off x="-819627" y="4793113"/>
+                <a:ext cx="2364775" cy="523220"/>
+              </a:xfrm>
+              <a:prstGeom prst="rect">
+                <a:avLst/>
+              </a:prstGeom>
+              <a:noFill/>
+            </p:spPr>
+            <p:txBody>
+              <a:bodyPr wrap="square" rtlCol="0">
+                <a:spAutoFit/>
+              </a:bodyPr>
+              <a:lstStyle/>
+              <a:p>
+                <a:pPr algn="ctr"/>
+                <a:r>
+                  <a:rPr lang="en-US" sz="1400" b="1" dirty="0" smtClean="0"/>
+                  <a:t>Percentage of Coefficients (30,563 Total)</a:t>
+                </a:r>
+                <a:endParaRPr lang="en-US" sz="1400" b="1" dirty="0"/>
+              </a:p>
+            </p:txBody>
+          </p:sp>
+          <p:sp>
+            <p:nvSpPr>
+              <p:cNvPr id="20" name="TextBox 19"/>
+              <p:cNvSpPr txBox="1"/>
+              <p:nvPr/>
+            </p:nvSpPr>
+            <p:spPr>
+              <a:xfrm>
+                <a:off x="326505" y="3505190"/>
+                <a:ext cx="556952" cy="369332"/>
+              </a:xfrm>
+              <a:prstGeom prst="rect">
+                <a:avLst/>
+              </a:prstGeom>
+              <a:noFill/>
+            </p:spPr>
+            <p:txBody>
+              <a:bodyPr wrap="square" rtlCol="0">
+                <a:spAutoFit/>
+              </a:bodyPr>
+              <a:lstStyle/>
+              <a:p>
+                <a:r>
+                  <a:rPr lang="en-US" dirty="0" smtClean="0"/>
+                  <a:t>c)</a:t>
+                </a:r>
+                <a:endParaRPr lang="en-US" dirty="0"/>
+              </a:p>
+            </p:txBody>
+          </p:sp>
+        </p:grpSp>
+        <p:pic>
+          <p:nvPicPr>
+            <p:cNvPr id="22" name="Picture 21"/>
+            <p:cNvPicPr>
+              <a:picLocks noChangeAspect="1"/>
+            </p:cNvPicPr>
+            <p:nvPr/>
+          </p:nvPicPr>
+          <p:blipFill>
+            <a:blip r:embed="rId5"/>
+            <a:stretch>
+              <a:fillRect/>
+            </a:stretch>
+          </p:blipFill>
+          <p:spPr>
+            <a:xfrm>
+              <a:off x="6425738" y="3595565"/>
+              <a:ext cx="5331727" cy="2564157"/>
+            </a:xfrm>
+            <a:prstGeom prst="rect">
+              <a:avLst/>
+            </a:prstGeom>
+          </p:spPr>
+        </p:pic>
+        <p:sp>
+          <p:nvSpPr>
+            <p:cNvPr id="23" name="TextBox 22"/>
+            <p:cNvSpPr txBox="1"/>
+            <p:nvPr/>
+          </p:nvSpPr>
+          <p:spPr>
+            <a:xfrm>
+              <a:off x="8321589" y="6145327"/>
+              <a:ext cx="2364775" cy="523220"/>
+            </a:xfrm>
+            <a:prstGeom prst="rect">
+              <a:avLst/>
+            </a:prstGeom>
+            <a:noFill/>
+          </p:spPr>
+          <p:txBody>
+            <a:bodyPr wrap="square" rtlCol="0">
+              <a:spAutoFit/>
+            </a:bodyPr>
+            <a:lstStyle/>
+            <a:p>
+              <a:pPr algn="ctr"/>
+              <a:r>
+                <a:rPr lang="en-US" sz="1400" b="1" dirty="0" smtClean="0"/>
+                <a:t>PS Coefficients Not Filtered (30,563 Total)</a:t>
+              </a:r>
+              <a:endParaRPr lang="en-US" sz="1400" b="1" dirty="0"/>
+            </a:p>
+          </p:txBody>
+        </p:sp>
+        <p:sp>
+          <p:nvSpPr>
+            <p:cNvPr id="24" name="TextBox 23"/>
+            <p:cNvSpPr txBox="1"/>
+            <p:nvPr/>
+          </p:nvSpPr>
+          <p:spPr>
+            <a:xfrm rot="16200000">
+              <a:off x="4842022" y="4449528"/>
+              <a:ext cx="2364775" cy="523220"/>
+            </a:xfrm>
+            <a:prstGeom prst="rect">
+              <a:avLst/>
+            </a:prstGeom>
+            <a:noFill/>
+          </p:spPr>
+          <p:txBody>
+            <a:bodyPr wrap="square" rtlCol="0">
+              <a:spAutoFit/>
+            </a:bodyPr>
+            <a:lstStyle/>
+            <a:p>
+              <a:pPr algn="ctr"/>
+              <a:r>
+                <a:rPr lang="en-US" sz="1400" b="1" dirty="0" smtClean="0"/>
+                <a:t>Correlation to Distances</a:t>
+              </a:r>
+            </a:p>
+            <a:p>
+              <a:pPr algn="ctr"/>
+              <a:r>
+                <a:rPr lang="en-US" sz="1400" b="1" dirty="0" smtClean="0"/>
+                <a:t> from Unfiltered PS</a:t>
+              </a:r>
+              <a:endParaRPr lang="en-US" sz="1400" b="1" dirty="0"/>
+            </a:p>
+          </p:txBody>
+        </p:sp>
+        <p:sp>
+          <p:nvSpPr>
+            <p:cNvPr id="25" name="TextBox 24"/>
+            <p:cNvSpPr txBox="1"/>
+            <p:nvPr/>
+          </p:nvSpPr>
+          <p:spPr>
+            <a:xfrm>
+              <a:off x="5950063" y="3402672"/>
+              <a:ext cx="556952" cy="369332"/>
+            </a:xfrm>
+            <a:prstGeom prst="rect">
+              <a:avLst/>
+            </a:prstGeom>
+            <a:noFill/>
+          </p:spPr>
+          <p:txBody>
+            <a:bodyPr wrap="square" rtlCol="0">
+              <a:spAutoFit/>
+            </a:bodyPr>
+            <a:lstStyle/>
+            <a:p>
+              <a:r>
+                <a:rPr lang="en-US" dirty="0"/>
+                <a:t>d</a:t>
+              </a:r>
+              <a:r>
+                <a:rPr lang="en-US" dirty="0" smtClean="0"/>
+                <a:t>)</a:t>
+              </a:r>
+              <a:endParaRPr lang="en-US" dirty="0"/>
+            </a:p>
+          </p:txBody>
+        </p:sp>
+      </p:grpSp>
+    </p:spTree>
+    <p:extLst>
+      <p:ext uri="{BB962C8B-B14F-4D97-AF65-F5344CB8AC3E}">
+        <p14:creationId xmlns:p14="http://schemas.microsoft.com/office/powerpoint/2010/main" val="4199770109"/>
+      </p:ext>
+    </p:extLst>
+  </p:cSld>
+  <p:clrMapOvr>
+    <a:masterClrMapping/>
+  </p:clrMapOvr>
+</p:sld>
+</file>
+
+<file path=ppt/slides/slide7.xml><?xml version="1.0" encoding="utf-8"?>
+<p:sld xmlns:a="http://schemas.openxmlformats.org/drawingml/2006/main" xmlns:r="http://schemas.openxmlformats.org/officeDocument/2006/relationships" xmlns:p="http://schemas.openxmlformats.org/presentationml/2006/main">
+  <p:cSld>
+    <p:spTree>
+      <p:nvGrpSpPr>
+        <p:cNvPr id="1" name=""/>
+        <p:cNvGrpSpPr/>
+        <p:nvPr/>
+      </p:nvGrpSpPr>
+      <p:grpSpPr>
+        <a:xfrm>
+          <a:off x="0" y="0"/>
+          <a:ext cx="0" cy="0"/>
+          <a:chOff x="0" y="0"/>
+          <a:chExt cx="0" cy="0"/>
+        </a:xfrm>
+      </p:grpSpPr>
+      <p:grpSp>
+        <p:nvGrpSpPr>
+          <p:cNvPr id="15" name="Group 14"/>
+          <p:cNvGrpSpPr/>
+          <p:nvPr/>
+        </p:nvGrpSpPr>
+        <p:grpSpPr>
+          <a:xfrm>
+            <a:off x="-1" y="548640"/>
+            <a:ext cx="12017866" cy="4340090"/>
+            <a:chOff x="-1" y="548640"/>
+            <a:chExt cx="12017866" cy="4340090"/>
+          </a:xfrm>
+        </p:grpSpPr>
+        <p:pic>
+          <p:nvPicPr>
+            <p:cNvPr id="2" name="Picture 1"/>
+            <p:cNvPicPr>
+              <a:picLocks noChangeAspect="1"/>
+            </p:cNvPicPr>
+            <p:nvPr/>
+          </p:nvPicPr>
+          <p:blipFill>
+            <a:blip r:embed="rId2"/>
+            <a:stretch>
+              <a:fillRect/>
+            </a:stretch>
+          </p:blipFill>
+          <p:spPr>
+            <a:xfrm>
+              <a:off x="7943651" y="548640"/>
+              <a:ext cx="4074214" cy="4096095"/>
+            </a:xfrm>
+            <a:prstGeom prst="rect">
+              <a:avLst/>
+            </a:prstGeom>
+          </p:spPr>
+        </p:pic>
+        <p:sp>
+          <p:nvSpPr>
+            <p:cNvPr id="9" name="TextBox 8"/>
+            <p:cNvSpPr txBox="1"/>
+            <p:nvPr/>
+          </p:nvSpPr>
+          <p:spPr>
+            <a:xfrm rot="16200000">
+              <a:off x="6502491" y="2552351"/>
+              <a:ext cx="2364775" cy="338554"/>
+            </a:xfrm>
+            <a:prstGeom prst="rect">
+              <a:avLst/>
+            </a:prstGeom>
+            <a:noFill/>
+          </p:spPr>
+          <p:txBody>
+            <a:bodyPr wrap="square" rtlCol="0">
+              <a:spAutoFit/>
+            </a:bodyPr>
+            <a:lstStyle/>
+            <a:p>
+              <a:pPr algn="ctr"/>
+              <a:r>
+                <a:rPr lang="en-US" sz="1600" b="1" dirty="0" smtClean="0"/>
+                <a:t>Component 2</a:t>
+              </a:r>
+              <a:endParaRPr lang="en-US" sz="1600" b="1" dirty="0"/>
+            </a:p>
+          </p:txBody>
+        </p:sp>
+        <p:sp>
+          <p:nvSpPr>
+            <p:cNvPr id="10" name="TextBox 9"/>
+            <p:cNvSpPr txBox="1"/>
+            <p:nvPr/>
+          </p:nvSpPr>
+          <p:spPr>
+            <a:xfrm>
+              <a:off x="9007393" y="4550176"/>
+              <a:ext cx="2364775" cy="338554"/>
+            </a:xfrm>
+            <a:prstGeom prst="rect">
+              <a:avLst/>
+            </a:prstGeom>
+            <a:noFill/>
+          </p:spPr>
+          <p:txBody>
+            <a:bodyPr wrap="square" rtlCol="0">
+              <a:spAutoFit/>
+            </a:bodyPr>
+            <a:lstStyle/>
+            <a:p>
+              <a:pPr algn="ctr"/>
+              <a:r>
+                <a:rPr lang="en-US" sz="1600" b="1" dirty="0" smtClean="0"/>
+                <a:t>Component 1</a:t>
+              </a:r>
+              <a:endParaRPr lang="en-US" sz="1600" b="1" dirty="0"/>
+            </a:p>
+          </p:txBody>
+        </p:sp>
+        <p:pic>
+          <p:nvPicPr>
+            <p:cNvPr id="3" name="Picture 2"/>
+            <p:cNvPicPr>
+              <a:picLocks noChangeAspect="1"/>
+            </p:cNvPicPr>
+            <p:nvPr/>
+          </p:nvPicPr>
+          <p:blipFill>
+            <a:blip r:embed="rId3"/>
+            <a:stretch>
+              <a:fillRect/>
+            </a:stretch>
+          </p:blipFill>
+          <p:spPr>
+            <a:xfrm>
+              <a:off x="299258" y="1047403"/>
+              <a:ext cx="6956537" cy="3491625"/>
+            </a:xfrm>
+            <a:prstGeom prst="rect">
+              <a:avLst/>
+            </a:prstGeom>
+          </p:spPr>
+        </p:pic>
+        <p:sp>
+          <p:nvSpPr>
+            <p:cNvPr id="11" name="TextBox 10"/>
+            <p:cNvSpPr txBox="1"/>
+            <p:nvPr/>
+          </p:nvSpPr>
+          <p:spPr>
+            <a:xfrm>
+              <a:off x="2734055" y="4486445"/>
+              <a:ext cx="2364775" cy="338554"/>
+            </a:xfrm>
+            <a:prstGeom prst="rect">
+              <a:avLst/>
+            </a:prstGeom>
+            <a:noFill/>
+          </p:spPr>
+          <p:txBody>
+            <a:bodyPr wrap="square" rtlCol="0">
+              <a:spAutoFit/>
+            </a:bodyPr>
+            <a:lstStyle/>
+            <a:p>
+              <a:pPr algn="ctr"/>
+              <a:r>
+                <a:rPr lang="en-US" sz="1600" b="1" dirty="0" smtClean="0"/>
+                <a:t>Component</a:t>
+              </a:r>
+              <a:endParaRPr lang="en-US" sz="1600" b="1" dirty="0"/>
+            </a:p>
+          </p:txBody>
+        </p:sp>
+        <p:sp>
+          <p:nvSpPr>
+            <p:cNvPr id="12" name="TextBox 11"/>
+            <p:cNvSpPr txBox="1"/>
+            <p:nvPr/>
+          </p:nvSpPr>
+          <p:spPr>
+            <a:xfrm rot="16200000">
+              <a:off x="-1013112" y="2646562"/>
+              <a:ext cx="2364775" cy="338554"/>
+            </a:xfrm>
+            <a:prstGeom prst="rect">
+              <a:avLst/>
+            </a:prstGeom>
+            <a:noFill/>
+          </p:spPr>
+          <p:txBody>
+            <a:bodyPr wrap="square" rtlCol="0">
+              <a:spAutoFit/>
+            </a:bodyPr>
+            <a:lstStyle/>
+            <a:p>
+              <a:pPr algn="ctr"/>
+              <a:r>
+                <a:rPr lang="en-US" sz="1600" b="1" dirty="0" smtClean="0"/>
+                <a:t>Variance</a:t>
+              </a:r>
+              <a:endParaRPr lang="en-US" sz="1600" b="1" dirty="0"/>
+            </a:p>
+          </p:txBody>
+        </p:sp>
+        <p:sp>
+          <p:nvSpPr>
+            <p:cNvPr id="13" name="TextBox 12"/>
+            <p:cNvSpPr txBox="1"/>
+            <p:nvPr/>
+          </p:nvSpPr>
+          <p:spPr>
+            <a:xfrm>
+              <a:off x="316112" y="698269"/>
+              <a:ext cx="556952" cy="369332"/>
+            </a:xfrm>
+            <a:prstGeom prst="rect">
+              <a:avLst/>
+            </a:prstGeom>
+            <a:noFill/>
+          </p:spPr>
+          <p:txBody>
+            <a:bodyPr wrap="square" rtlCol="0">
+              <a:spAutoFit/>
+            </a:bodyPr>
+            <a:lstStyle/>
+            <a:p>
+              <a:r>
+                <a:rPr lang="en-US" dirty="0" smtClean="0"/>
+                <a:t>a)</a:t>
+              </a:r>
+              <a:endParaRPr lang="en-US" dirty="0"/>
+            </a:p>
+          </p:txBody>
+        </p:sp>
+        <p:sp>
+          <p:nvSpPr>
+            <p:cNvPr id="14" name="TextBox 13"/>
+            <p:cNvSpPr txBox="1"/>
+            <p:nvPr/>
+          </p:nvSpPr>
+          <p:spPr>
+            <a:xfrm>
+              <a:off x="7459515" y="692728"/>
+              <a:ext cx="556952" cy="369332"/>
+            </a:xfrm>
+            <a:prstGeom prst="rect">
+              <a:avLst/>
+            </a:prstGeom>
+            <a:noFill/>
+          </p:spPr>
+          <p:txBody>
+            <a:bodyPr wrap="square" rtlCol="0">
+              <a:spAutoFit/>
+            </a:bodyPr>
+            <a:lstStyle/>
+            <a:p>
+              <a:r>
+                <a:rPr lang="en-US" dirty="0" smtClean="0"/>
+                <a:t>b)</a:t>
+              </a:r>
+              <a:endParaRPr lang="en-US" dirty="0"/>
+            </a:p>
+          </p:txBody>
+        </p:sp>
+      </p:grpSp>
+    </p:spTree>
+    <p:extLst>
+      <p:ext uri="{BB962C8B-B14F-4D97-AF65-F5344CB8AC3E}">
+        <p14:creationId xmlns:p14="http://schemas.microsoft.com/office/powerpoint/2010/main" val="2806861465"/>
       </p:ext>
     </p:extLst>
   </p:cSld>

</xml_diff>